<commit_message>
Update Advanced github topics.pptx
Added forking slides
</commit_message>
<xml_diff>
--- a/resources/Advanced github topics.pptx
+++ b/resources/Advanced github topics.pptx
@@ -5,10 +5,10 @@
     <p:sldMasterId id="2147483669" r:id="rId4"/>
   </p:sldMasterIdLst>
   <p:notesMasterIdLst>
-    <p:notesMasterId r:id="rId23"/>
+    <p:notesMasterId r:id="rId30"/>
   </p:notesMasterIdLst>
   <p:handoutMasterIdLst>
-    <p:handoutMasterId r:id="rId24"/>
+    <p:handoutMasterId r:id="rId31"/>
   </p:handoutMasterIdLst>
   <p:sldIdLst>
     <p:sldId id="256" r:id="rId5"/>
@@ -28,7 +28,14 @@
     <p:sldId id="297" r:id="rId19"/>
     <p:sldId id="298" r:id="rId20"/>
     <p:sldId id="299" r:id="rId21"/>
-    <p:sldId id="265" r:id="rId22"/>
+    <p:sldId id="257" r:id="rId22"/>
+    <p:sldId id="301" r:id="rId23"/>
+    <p:sldId id="259" r:id="rId24"/>
+    <p:sldId id="260" r:id="rId25"/>
+    <p:sldId id="261" r:id="rId26"/>
+    <p:sldId id="262" r:id="rId27"/>
+    <p:sldId id="263" r:id="rId28"/>
+    <p:sldId id="265" r:id="rId29"/>
   </p:sldIdLst>
   <p:sldSz cx="12192000" cy="6858000"/>
   <p:notesSz cx="6858000" cy="9144000"/>
@@ -733,7 +740,7 @@
           <a:noFill/>
           <a:extLst>
             <a:ext uri="{909E8E84-426E-40dd-AFC4-6F175D3DCCD1}">
-              <a14:hiddenFill xmlns="" xmlns:a14="http://schemas.microsoft.com/office/drawing/2010/main">
+              <a14:hiddenFill xmlns:a14="http://schemas.microsoft.com/office/drawing/2010/main" xmlns="">
                 <a:solidFill>
                   <a:srgbClr val="FFFFFF"/>
                 </a:solidFill>
@@ -792,7 +799,7 @@
             </a:ln>
             <a:extLst>
               <a:ext uri="{91240B29-F687-4f45-9708-019B960494DF}">
-                <a14:hiddenLine xmlns="" xmlns:a14="http://schemas.microsoft.com/office/drawing/2010/main" w="9525">
+                <a14:hiddenLine xmlns:a14="http://schemas.microsoft.com/office/drawing/2010/main" xmlns="" w="9525">
                   <a:solidFill>
                     <a:srgbClr val="000000"/>
                   </a:solidFill>
@@ -882,7 +889,7 @@
             </a:ln>
             <a:extLst>
               <a:ext uri="{91240B29-F687-4f45-9708-019B960494DF}">
-                <a14:hiddenLine xmlns="" xmlns:a14="http://schemas.microsoft.com/office/drawing/2010/main" w="9525">
+                <a14:hiddenLine xmlns:a14="http://schemas.microsoft.com/office/drawing/2010/main" xmlns="" w="9525">
                   <a:solidFill>
                     <a:srgbClr val="000000"/>
                   </a:solidFill>
@@ -972,7 +979,7 @@
             </a:ln>
             <a:extLst>
               <a:ext uri="{91240B29-F687-4f45-9708-019B960494DF}">
-                <a14:hiddenLine xmlns="" xmlns:a14="http://schemas.microsoft.com/office/drawing/2010/main" w="9525">
+                <a14:hiddenLine xmlns:a14="http://schemas.microsoft.com/office/drawing/2010/main" xmlns="" w="9525">
                   <a:solidFill>
                     <a:srgbClr val="000000"/>
                   </a:solidFill>
@@ -1006,7 +1013,7 @@
             </a:ln>
             <a:extLst>
               <a:ext uri="{91240B29-F687-4f45-9708-019B960494DF}">
-                <a14:hiddenLine xmlns="" xmlns:a14="http://schemas.microsoft.com/office/drawing/2010/main" w="9525">
+                <a14:hiddenLine xmlns:a14="http://schemas.microsoft.com/office/drawing/2010/main" xmlns="" w="9525">
                   <a:solidFill>
                     <a:srgbClr val="000000"/>
                   </a:solidFill>
@@ -1096,7 +1103,7 @@
             </a:ln>
             <a:extLst>
               <a:ext uri="{91240B29-F687-4f45-9708-019B960494DF}">
-                <a14:hiddenLine xmlns="" xmlns:a14="http://schemas.microsoft.com/office/drawing/2010/main" w="9525">
+                <a14:hiddenLine xmlns:a14="http://schemas.microsoft.com/office/drawing/2010/main" xmlns="" w="9525">
                   <a:solidFill>
                     <a:srgbClr val="000000"/>
                   </a:solidFill>
@@ -1158,7 +1165,7 @@
             </a:ln>
             <a:extLst>
               <a:ext uri="{91240B29-F687-4f45-9708-019B960494DF}">
-                <a14:hiddenLine xmlns="" xmlns:a14="http://schemas.microsoft.com/office/drawing/2010/main" w="9525">
+                <a14:hiddenLine xmlns:a14="http://schemas.microsoft.com/office/drawing/2010/main" xmlns="" w="9525">
                   <a:solidFill>
                     <a:srgbClr val="000000"/>
                   </a:solidFill>
@@ -1220,7 +1227,7 @@
             </a:ln>
             <a:extLst>
               <a:ext uri="{91240B29-F687-4f45-9708-019B960494DF}">
-                <a14:hiddenLine xmlns="" xmlns:a14="http://schemas.microsoft.com/office/drawing/2010/main" w="9525">
+                <a14:hiddenLine xmlns:a14="http://schemas.microsoft.com/office/drawing/2010/main" xmlns="" w="9525">
                   <a:solidFill>
                     <a:srgbClr val="000000"/>
                   </a:solidFill>
@@ -1310,7 +1317,7 @@
             </a:ln>
             <a:extLst>
               <a:ext uri="{91240B29-F687-4f45-9708-019B960494DF}">
-                <a14:hiddenLine xmlns="" xmlns:a14="http://schemas.microsoft.com/office/drawing/2010/main" w="9525">
+                <a14:hiddenLine xmlns:a14="http://schemas.microsoft.com/office/drawing/2010/main" xmlns="" w="9525">
                   <a:solidFill>
                     <a:srgbClr val="000000"/>
                   </a:solidFill>
@@ -1372,7 +1379,7 @@
             </a:ln>
             <a:extLst>
               <a:ext uri="{91240B29-F687-4f45-9708-019B960494DF}">
-                <a14:hiddenLine xmlns="" xmlns:a14="http://schemas.microsoft.com/office/drawing/2010/main" w="9525">
+                <a14:hiddenLine xmlns:a14="http://schemas.microsoft.com/office/drawing/2010/main" xmlns="" w="9525">
                   <a:solidFill>
                     <a:srgbClr val="000000"/>
                   </a:solidFill>
@@ -1434,7 +1441,7 @@
             </a:ln>
             <a:extLst>
               <a:ext uri="{91240B29-F687-4f45-9708-019B960494DF}">
-                <a14:hiddenLine xmlns="" xmlns:a14="http://schemas.microsoft.com/office/drawing/2010/main" w="9525">
+                <a14:hiddenLine xmlns:a14="http://schemas.microsoft.com/office/drawing/2010/main" xmlns="" w="9525">
                   <a:solidFill>
                     <a:srgbClr val="000000"/>
                   </a:solidFill>
@@ -1524,7 +1531,7 @@
             </a:ln>
             <a:extLst>
               <a:ext uri="{91240B29-F687-4f45-9708-019B960494DF}">
-                <a14:hiddenLine xmlns="" xmlns:a14="http://schemas.microsoft.com/office/drawing/2010/main" w="9525">
+                <a14:hiddenLine xmlns:a14="http://schemas.microsoft.com/office/drawing/2010/main" xmlns="" w="9525">
                   <a:solidFill>
                     <a:srgbClr val="000000"/>
                   </a:solidFill>
@@ -1614,7 +1621,7 @@
             </a:ln>
             <a:extLst>
               <a:ext uri="{91240B29-F687-4f45-9708-019B960494DF}">
-                <a14:hiddenLine xmlns="" xmlns:a14="http://schemas.microsoft.com/office/drawing/2010/main" w="9525">
+                <a14:hiddenLine xmlns:a14="http://schemas.microsoft.com/office/drawing/2010/main" xmlns="" w="9525">
                   <a:solidFill>
                     <a:srgbClr val="000000"/>
                   </a:solidFill>
@@ -1676,7 +1683,7 @@
             </a:ln>
             <a:extLst>
               <a:ext uri="{91240B29-F687-4f45-9708-019B960494DF}">
-                <a14:hiddenLine xmlns="" xmlns:a14="http://schemas.microsoft.com/office/drawing/2010/main" w="9525">
+                <a14:hiddenLine xmlns:a14="http://schemas.microsoft.com/office/drawing/2010/main" xmlns="" w="9525">
                   <a:solidFill>
                     <a:srgbClr val="000000"/>
                   </a:solidFill>
@@ -1786,7 +1793,7 @@
             </a:ln>
             <a:extLst>
               <a:ext uri="{91240B29-F687-4f45-9708-019B960494DF}">
-                <a14:hiddenLine xmlns="" xmlns:a14="http://schemas.microsoft.com/office/drawing/2010/main" w="9525">
+                <a14:hiddenLine xmlns:a14="http://schemas.microsoft.com/office/drawing/2010/main" xmlns="" w="9525">
                   <a:solidFill>
                     <a:srgbClr val="000000"/>
                   </a:solidFill>
@@ -1848,7 +1855,7 @@
             </a:ln>
             <a:extLst>
               <a:ext uri="{91240B29-F687-4f45-9708-019B960494DF}">
-                <a14:hiddenLine xmlns="" xmlns:a14="http://schemas.microsoft.com/office/drawing/2010/main" w="9525">
+                <a14:hiddenLine xmlns:a14="http://schemas.microsoft.com/office/drawing/2010/main" xmlns="" w="9525">
                   <a:solidFill>
                     <a:srgbClr val="000000"/>
                   </a:solidFill>
@@ -1938,7 +1945,7 @@
             </a:ln>
             <a:extLst>
               <a:ext uri="{91240B29-F687-4f45-9708-019B960494DF}">
-                <a14:hiddenLine xmlns="" xmlns:a14="http://schemas.microsoft.com/office/drawing/2010/main" w="9525">
+                <a14:hiddenLine xmlns:a14="http://schemas.microsoft.com/office/drawing/2010/main" xmlns="" w="9525">
                   <a:solidFill>
                     <a:srgbClr val="000000"/>
                   </a:solidFill>
@@ -2028,7 +2035,7 @@
             </a:ln>
             <a:extLst>
               <a:ext uri="{91240B29-F687-4f45-9708-019B960494DF}">
-                <a14:hiddenLine xmlns="" xmlns:a14="http://schemas.microsoft.com/office/drawing/2010/main" w="9525">
+                <a14:hiddenLine xmlns:a14="http://schemas.microsoft.com/office/drawing/2010/main" xmlns="" w="9525">
                   <a:solidFill>
                     <a:srgbClr val="000000"/>
                   </a:solidFill>
@@ -2090,7 +2097,7 @@
             </a:ln>
             <a:extLst>
               <a:ext uri="{91240B29-F687-4f45-9708-019B960494DF}">
-                <a14:hiddenLine xmlns="" xmlns:a14="http://schemas.microsoft.com/office/drawing/2010/main" w="9525">
+                <a14:hiddenLine xmlns:a14="http://schemas.microsoft.com/office/drawing/2010/main" xmlns="" w="9525">
                   <a:solidFill>
                     <a:srgbClr val="000000"/>
                   </a:solidFill>
@@ -2180,7 +2187,7 @@
             </a:ln>
             <a:extLst>
               <a:ext uri="{91240B29-F687-4f45-9708-019B960494DF}">
-                <a14:hiddenLine xmlns="" xmlns:a14="http://schemas.microsoft.com/office/drawing/2010/main" w="9525">
+                <a14:hiddenLine xmlns:a14="http://schemas.microsoft.com/office/drawing/2010/main" xmlns="" w="9525">
                   <a:solidFill>
                     <a:srgbClr val="000000"/>
                   </a:solidFill>
@@ -2270,7 +2277,7 @@
             </a:ln>
             <a:extLst>
               <a:ext uri="{91240B29-F687-4f45-9708-019B960494DF}">
-                <a14:hiddenLine xmlns="" xmlns:a14="http://schemas.microsoft.com/office/drawing/2010/main" w="9525">
+                <a14:hiddenLine xmlns:a14="http://schemas.microsoft.com/office/drawing/2010/main" xmlns="" w="9525">
                   <a:solidFill>
                     <a:srgbClr val="000000"/>
                   </a:solidFill>
@@ -2326,7 +2333,7 @@
             </a:ln>
             <a:extLst>
               <a:ext uri="{91240B29-F687-4f45-9708-019B960494DF}">
-                <a14:hiddenLine xmlns="" xmlns:a14="http://schemas.microsoft.com/office/drawing/2010/main" w="9525">
+                <a14:hiddenLine xmlns:a14="http://schemas.microsoft.com/office/drawing/2010/main" xmlns="" w="9525">
                   <a:solidFill>
                     <a:srgbClr val="000000"/>
                   </a:solidFill>
@@ -2416,7 +2423,7 @@
             </a:ln>
             <a:extLst>
               <a:ext uri="{91240B29-F687-4f45-9708-019B960494DF}">
-                <a14:hiddenLine xmlns="" xmlns:a14="http://schemas.microsoft.com/office/drawing/2010/main" w="9525">
+                <a14:hiddenLine xmlns:a14="http://schemas.microsoft.com/office/drawing/2010/main" xmlns="" w="9525">
                   <a:solidFill>
                     <a:srgbClr val="000000"/>
                   </a:solidFill>
@@ -2472,7 +2479,7 @@
             </a:ln>
             <a:extLst>
               <a:ext uri="{91240B29-F687-4f45-9708-019B960494DF}">
-                <a14:hiddenLine xmlns="" xmlns:a14="http://schemas.microsoft.com/office/drawing/2010/main" w="9525">
+                <a14:hiddenLine xmlns:a14="http://schemas.microsoft.com/office/drawing/2010/main" xmlns="" w="9525">
                   <a:solidFill>
                     <a:srgbClr val="000000"/>
                   </a:solidFill>
@@ -2562,7 +2569,7 @@
             </a:ln>
             <a:extLst>
               <a:ext uri="{91240B29-F687-4f45-9708-019B960494DF}">
-                <a14:hiddenLine xmlns="" xmlns:a14="http://schemas.microsoft.com/office/drawing/2010/main" w="9525">
+                <a14:hiddenLine xmlns:a14="http://schemas.microsoft.com/office/drawing/2010/main" xmlns="" w="9525">
                   <a:solidFill>
                     <a:srgbClr val="000000"/>
                   </a:solidFill>
@@ -2630,7 +2637,7 @@
             </a:ln>
             <a:extLst>
               <a:ext uri="{91240B29-F687-4f45-9708-019B960494DF}">
-                <a14:hiddenLine xmlns="" xmlns:a14="http://schemas.microsoft.com/office/drawing/2010/main" w="9525">
+                <a14:hiddenLine xmlns:a14="http://schemas.microsoft.com/office/drawing/2010/main" xmlns="" w="9525">
                   <a:solidFill>
                     <a:srgbClr val="000000"/>
                   </a:solidFill>
@@ -2720,7 +2727,7 @@
             </a:ln>
             <a:extLst>
               <a:ext uri="{91240B29-F687-4f45-9708-019B960494DF}">
-                <a14:hiddenLine xmlns="" xmlns:a14="http://schemas.microsoft.com/office/drawing/2010/main" w="9525">
+                <a14:hiddenLine xmlns:a14="http://schemas.microsoft.com/office/drawing/2010/main" xmlns="" w="9525">
                   <a:solidFill>
                     <a:srgbClr val="000000"/>
                   </a:solidFill>
@@ -2788,7 +2795,7 @@
             </a:ln>
             <a:extLst>
               <a:ext uri="{91240B29-F687-4f45-9708-019B960494DF}">
-                <a14:hiddenLine xmlns="" xmlns:a14="http://schemas.microsoft.com/office/drawing/2010/main" w="9525">
+                <a14:hiddenLine xmlns:a14="http://schemas.microsoft.com/office/drawing/2010/main" xmlns="" w="9525">
                   <a:solidFill>
                     <a:srgbClr val="000000"/>
                   </a:solidFill>
@@ -2878,7 +2885,7 @@
             </a:ln>
             <a:extLst>
               <a:ext uri="{91240B29-F687-4f45-9708-019B960494DF}">
-                <a14:hiddenLine xmlns="" xmlns:a14="http://schemas.microsoft.com/office/drawing/2010/main" w="9525">
+                <a14:hiddenLine xmlns:a14="http://schemas.microsoft.com/office/drawing/2010/main" xmlns="" w="9525">
                   <a:solidFill>
                     <a:srgbClr val="000000"/>
                   </a:solidFill>
@@ -2912,7 +2919,7 @@
             </a:ln>
             <a:extLst>
               <a:ext uri="{91240B29-F687-4f45-9708-019B960494DF}">
-                <a14:hiddenLine xmlns="" xmlns:a14="http://schemas.microsoft.com/office/drawing/2010/main" w="9525">
+                <a14:hiddenLine xmlns:a14="http://schemas.microsoft.com/office/drawing/2010/main" xmlns="" w="9525">
                   <a:solidFill>
                     <a:srgbClr val="000000"/>
                   </a:solidFill>
@@ -3002,7 +3009,7 @@
             </a:ln>
             <a:extLst>
               <a:ext uri="{91240B29-F687-4f45-9708-019B960494DF}">
-                <a14:hiddenLine xmlns="" xmlns:a14="http://schemas.microsoft.com/office/drawing/2010/main" w="9525">
+                <a14:hiddenLine xmlns:a14="http://schemas.microsoft.com/office/drawing/2010/main" xmlns="" w="9525">
                   <a:solidFill>
                     <a:srgbClr val="000000"/>
                   </a:solidFill>
@@ -3064,7 +3071,7 @@
             </a:ln>
             <a:extLst>
               <a:ext uri="{91240B29-F687-4f45-9708-019B960494DF}">
-                <a14:hiddenLine xmlns="" xmlns:a14="http://schemas.microsoft.com/office/drawing/2010/main" w="9525">
+                <a14:hiddenLine xmlns:a14="http://schemas.microsoft.com/office/drawing/2010/main" xmlns="" w="9525">
                   <a:solidFill>
                     <a:srgbClr val="000000"/>
                   </a:solidFill>
@@ -3126,7 +3133,7 @@
             </a:ln>
             <a:extLst>
               <a:ext uri="{91240B29-F687-4f45-9708-019B960494DF}">
-                <a14:hiddenLine xmlns="" xmlns:a14="http://schemas.microsoft.com/office/drawing/2010/main" w="9525">
+                <a14:hiddenLine xmlns:a14="http://schemas.microsoft.com/office/drawing/2010/main" xmlns="" w="9525">
                   <a:solidFill>
                     <a:srgbClr val="000000"/>
                   </a:solidFill>
@@ -3216,7 +3223,7 @@
             </a:ln>
             <a:extLst>
               <a:ext uri="{91240B29-F687-4f45-9708-019B960494DF}">
-                <a14:hiddenLine xmlns="" xmlns:a14="http://schemas.microsoft.com/office/drawing/2010/main" w="9525">
+                <a14:hiddenLine xmlns:a14="http://schemas.microsoft.com/office/drawing/2010/main" xmlns="" w="9525">
                   <a:solidFill>
                     <a:srgbClr val="000000"/>
                   </a:solidFill>
@@ -3284,7 +3291,7 @@
             </a:ln>
             <a:extLst>
               <a:ext uri="{91240B29-F687-4f45-9708-019B960494DF}">
-                <a14:hiddenLine xmlns="" xmlns:a14="http://schemas.microsoft.com/office/drawing/2010/main" w="9525">
+                <a14:hiddenLine xmlns:a14="http://schemas.microsoft.com/office/drawing/2010/main" xmlns="" w="9525">
                   <a:solidFill>
                     <a:srgbClr val="000000"/>
                   </a:solidFill>
@@ -3346,7 +3353,7 @@
             </a:ln>
             <a:extLst>
               <a:ext uri="{91240B29-F687-4f45-9708-019B960494DF}">
-                <a14:hiddenLine xmlns="" xmlns:a14="http://schemas.microsoft.com/office/drawing/2010/main" w="9525">
+                <a14:hiddenLine xmlns:a14="http://schemas.microsoft.com/office/drawing/2010/main" xmlns="" w="9525">
                   <a:solidFill>
                     <a:srgbClr val="000000"/>
                   </a:solidFill>
@@ -3436,7 +3443,7 @@
             </a:ln>
             <a:extLst>
               <a:ext uri="{91240B29-F687-4f45-9708-019B960494DF}">
-                <a14:hiddenLine xmlns="" xmlns:a14="http://schemas.microsoft.com/office/drawing/2010/main" w="9525">
+                <a14:hiddenLine xmlns:a14="http://schemas.microsoft.com/office/drawing/2010/main" xmlns="" w="9525">
                   <a:solidFill>
                     <a:srgbClr val="000000"/>
                   </a:solidFill>
@@ -3498,7 +3505,7 @@
             </a:ln>
             <a:extLst>
               <a:ext uri="{91240B29-F687-4f45-9708-019B960494DF}">
-                <a14:hiddenLine xmlns="" xmlns:a14="http://schemas.microsoft.com/office/drawing/2010/main" w="9525">
+                <a14:hiddenLine xmlns:a14="http://schemas.microsoft.com/office/drawing/2010/main" xmlns="" w="9525">
                   <a:solidFill>
                     <a:srgbClr val="000000"/>
                   </a:solidFill>
@@ -3588,7 +3595,7 @@
             </a:ln>
             <a:extLst>
               <a:ext uri="{91240B29-F687-4f45-9708-019B960494DF}">
-                <a14:hiddenLine xmlns="" xmlns:a14="http://schemas.microsoft.com/office/drawing/2010/main" w="9525">
+                <a14:hiddenLine xmlns:a14="http://schemas.microsoft.com/office/drawing/2010/main" xmlns="" w="9525">
                   <a:solidFill>
                     <a:srgbClr val="000000"/>
                   </a:solidFill>
@@ -3650,7 +3657,7 @@
             </a:ln>
             <a:extLst>
               <a:ext uri="{91240B29-F687-4f45-9708-019B960494DF}">
-                <a14:hiddenLine xmlns="" xmlns:a14="http://schemas.microsoft.com/office/drawing/2010/main" w="9525">
+                <a14:hiddenLine xmlns:a14="http://schemas.microsoft.com/office/drawing/2010/main" xmlns="" w="9525">
                   <a:solidFill>
                     <a:srgbClr val="000000"/>
                   </a:solidFill>
@@ -3740,7 +3747,7 @@
             </a:ln>
             <a:extLst>
               <a:ext uri="{91240B29-F687-4f45-9708-019B960494DF}">
-                <a14:hiddenLine xmlns="" xmlns:a14="http://schemas.microsoft.com/office/drawing/2010/main" w="9525">
+                <a14:hiddenLine xmlns:a14="http://schemas.microsoft.com/office/drawing/2010/main" xmlns="" w="9525">
                   <a:solidFill>
                     <a:srgbClr val="000000"/>
                   </a:solidFill>
@@ -3774,7 +3781,7 @@
             </a:ln>
             <a:extLst>
               <a:ext uri="{91240B29-F687-4f45-9708-019B960494DF}">
-                <a14:hiddenLine xmlns="" xmlns:a14="http://schemas.microsoft.com/office/drawing/2010/main" w="9525">
+                <a14:hiddenLine xmlns:a14="http://schemas.microsoft.com/office/drawing/2010/main" xmlns="" w="9525">
                   <a:solidFill>
                     <a:srgbClr val="000000"/>
                   </a:solidFill>
@@ -3839,7 +3846,7 @@
             </a:ln>
             <a:extLst>
               <a:ext uri="{91240B29-F687-4f45-9708-019B960494DF}">
-                <a14:hiddenLine xmlns="" xmlns:a14="http://schemas.microsoft.com/office/drawing/2010/main" w="9525">
+                <a14:hiddenLine xmlns:a14="http://schemas.microsoft.com/office/drawing/2010/main" xmlns="" w="9525">
                   <a:solidFill>
                     <a:srgbClr val="000000"/>
                   </a:solidFill>
@@ -3929,7 +3936,7 @@
             </a:ln>
             <a:extLst>
               <a:ext uri="{91240B29-F687-4f45-9708-019B960494DF}">
-                <a14:hiddenLine xmlns="" xmlns:a14="http://schemas.microsoft.com/office/drawing/2010/main" w="9525">
+                <a14:hiddenLine xmlns:a14="http://schemas.microsoft.com/office/drawing/2010/main" xmlns="" w="9525">
                   <a:solidFill>
                     <a:srgbClr val="000000"/>
                   </a:solidFill>
@@ -3991,7 +3998,7 @@
             </a:ln>
             <a:extLst>
               <a:ext uri="{91240B29-F687-4f45-9708-019B960494DF}">
-                <a14:hiddenLine xmlns="" xmlns:a14="http://schemas.microsoft.com/office/drawing/2010/main" w="9525">
+                <a14:hiddenLine xmlns:a14="http://schemas.microsoft.com/office/drawing/2010/main" xmlns="" w="9525">
                   <a:solidFill>
                     <a:srgbClr val="000000"/>
                   </a:solidFill>
@@ -4081,7 +4088,7 @@
             </a:ln>
             <a:extLst>
               <a:ext uri="{91240B29-F687-4f45-9708-019B960494DF}">
-                <a14:hiddenLine xmlns="" xmlns:a14="http://schemas.microsoft.com/office/drawing/2010/main" w="9525">
+                <a14:hiddenLine xmlns:a14="http://schemas.microsoft.com/office/drawing/2010/main" xmlns="" w="9525">
                   <a:solidFill>
                     <a:srgbClr val="000000"/>
                   </a:solidFill>
@@ -4171,7 +4178,7 @@
             </a:ln>
             <a:extLst>
               <a:ext uri="{91240B29-F687-4f45-9708-019B960494DF}">
-                <a14:hiddenLine xmlns="" xmlns:a14="http://schemas.microsoft.com/office/drawing/2010/main" w="9525">
+                <a14:hiddenLine xmlns:a14="http://schemas.microsoft.com/office/drawing/2010/main" xmlns="" w="9525">
                   <a:solidFill>
                     <a:srgbClr val="000000"/>
                   </a:solidFill>
@@ -4236,7 +4243,7 @@
             </a:ln>
             <a:extLst>
               <a:ext uri="{91240B29-F687-4f45-9708-019B960494DF}">
-                <a14:hiddenLine xmlns="" xmlns:a14="http://schemas.microsoft.com/office/drawing/2010/main" w="9525">
+                <a14:hiddenLine xmlns:a14="http://schemas.microsoft.com/office/drawing/2010/main" xmlns="" w="9525">
                   <a:solidFill>
                     <a:srgbClr val="000000"/>
                   </a:solidFill>
@@ -4298,7 +4305,7 @@
             </a:ln>
             <a:extLst>
               <a:ext uri="{91240B29-F687-4f45-9708-019B960494DF}">
-                <a14:hiddenLine xmlns="" xmlns:a14="http://schemas.microsoft.com/office/drawing/2010/main" w="9525">
+                <a14:hiddenLine xmlns:a14="http://schemas.microsoft.com/office/drawing/2010/main" xmlns="" w="9525">
                   <a:solidFill>
                     <a:srgbClr val="000000"/>
                   </a:solidFill>
@@ -4388,7 +4395,7 @@
             </a:ln>
             <a:extLst>
               <a:ext uri="{91240B29-F687-4f45-9708-019B960494DF}">
-                <a14:hiddenLine xmlns="" xmlns:a14="http://schemas.microsoft.com/office/drawing/2010/main" w="9525">
+                <a14:hiddenLine xmlns:a14="http://schemas.microsoft.com/office/drawing/2010/main" xmlns="" w="9525">
                   <a:solidFill>
                     <a:srgbClr val="000000"/>
                   </a:solidFill>
@@ -4478,7 +4485,7 @@
             </a:ln>
             <a:extLst>
               <a:ext uri="{91240B29-F687-4f45-9708-019B960494DF}">
-                <a14:hiddenLine xmlns="" xmlns:a14="http://schemas.microsoft.com/office/drawing/2010/main" w="9525">
+                <a14:hiddenLine xmlns:a14="http://schemas.microsoft.com/office/drawing/2010/main" xmlns="" w="9525">
                   <a:solidFill>
                     <a:srgbClr val="000000"/>
                   </a:solidFill>
@@ -4540,7 +4547,7 @@
             </a:ln>
             <a:extLst>
               <a:ext uri="{91240B29-F687-4f45-9708-019B960494DF}">
-                <a14:hiddenLine xmlns="" xmlns:a14="http://schemas.microsoft.com/office/drawing/2010/main" w="9525">
+                <a14:hiddenLine xmlns:a14="http://schemas.microsoft.com/office/drawing/2010/main" xmlns="" w="9525">
                   <a:solidFill>
                     <a:srgbClr val="000000"/>
                   </a:solidFill>
@@ -4660,7 +4667,7 @@
             </a:ln>
             <a:extLst>
               <a:ext uri="{91240B29-F687-4f45-9708-019B960494DF}">
-                <a14:hiddenLine xmlns="" xmlns:a14="http://schemas.microsoft.com/office/drawing/2010/main" w="9525">
+                <a14:hiddenLine xmlns:a14="http://schemas.microsoft.com/office/drawing/2010/main" xmlns="" w="9525">
                   <a:solidFill>
                     <a:srgbClr val="000000"/>
                   </a:solidFill>
@@ -4728,7 +4735,7 @@
             </a:ln>
             <a:extLst>
               <a:ext uri="{91240B29-F687-4f45-9708-019B960494DF}">
-                <a14:hiddenLine xmlns="" xmlns:a14="http://schemas.microsoft.com/office/drawing/2010/main" w="9525">
+                <a14:hiddenLine xmlns:a14="http://schemas.microsoft.com/office/drawing/2010/main" xmlns="" w="9525">
                   <a:solidFill>
                     <a:srgbClr val="000000"/>
                   </a:solidFill>
@@ -4818,7 +4825,7 @@
             </a:ln>
             <a:extLst>
               <a:ext uri="{91240B29-F687-4f45-9708-019B960494DF}">
-                <a14:hiddenLine xmlns="" xmlns:a14="http://schemas.microsoft.com/office/drawing/2010/main" w="9525">
+                <a14:hiddenLine xmlns:a14="http://schemas.microsoft.com/office/drawing/2010/main" xmlns="" w="9525">
                   <a:solidFill>
                     <a:srgbClr val="000000"/>
                   </a:solidFill>
@@ -9632,7 +9639,7 @@
           <a:noFill/>
           <a:extLst>
             <a:ext uri="{909E8E84-426E-40dd-AFC4-6F175D3DCCD1}">
-              <a14:hiddenFill xmlns="" xmlns:a14="http://schemas.microsoft.com/office/drawing/2010/main">
+              <a14:hiddenFill xmlns:a14="http://schemas.microsoft.com/office/drawing/2010/main" xmlns="">
                 <a:solidFill>
                   <a:srgbClr val="FFFFFF"/>
                 </a:solidFill>
@@ -9706,7 +9713,7 @@
               </a:ln>
               <a:extLst>
                 <a:ext uri="{91240B29-F687-4f45-9708-019B960494DF}">
-                  <a14:hiddenLine xmlns="" xmlns:a14="http://schemas.microsoft.com/office/drawing/2010/main" w="9525">
+                  <a14:hiddenLine xmlns:a14="http://schemas.microsoft.com/office/drawing/2010/main" xmlns="" w="9525">
                     <a:solidFill>
                       <a:srgbClr val="000000"/>
                     </a:solidFill>
@@ -9796,7 +9803,7 @@
               </a:ln>
               <a:extLst>
                 <a:ext uri="{91240B29-F687-4f45-9708-019B960494DF}">
-                  <a14:hiddenLine xmlns="" xmlns:a14="http://schemas.microsoft.com/office/drawing/2010/main" w="9525">
+                  <a14:hiddenLine xmlns:a14="http://schemas.microsoft.com/office/drawing/2010/main" xmlns="" w="9525">
                     <a:solidFill>
                       <a:srgbClr val="000000"/>
                     </a:solidFill>
@@ -9886,7 +9893,7 @@
               </a:ln>
               <a:extLst>
                 <a:ext uri="{91240B29-F687-4f45-9708-019B960494DF}">
-                  <a14:hiddenLine xmlns="" xmlns:a14="http://schemas.microsoft.com/office/drawing/2010/main" w="9525">
+                  <a14:hiddenLine xmlns:a14="http://schemas.microsoft.com/office/drawing/2010/main" xmlns="" w="9525">
                     <a:solidFill>
                       <a:srgbClr val="000000"/>
                     </a:solidFill>
@@ -9948,7 +9955,7 @@
               </a:ln>
               <a:extLst>
                 <a:ext uri="{91240B29-F687-4f45-9708-019B960494DF}">
-                  <a14:hiddenLine xmlns="" xmlns:a14="http://schemas.microsoft.com/office/drawing/2010/main" w="9525">
+                  <a14:hiddenLine xmlns:a14="http://schemas.microsoft.com/office/drawing/2010/main" xmlns="" w="9525">
                     <a:solidFill>
                       <a:srgbClr val="000000"/>
                     </a:solidFill>
@@ -10038,7 +10045,7 @@
               </a:ln>
               <a:extLst>
                 <a:ext uri="{91240B29-F687-4f45-9708-019B960494DF}">
-                  <a14:hiddenLine xmlns="" xmlns:a14="http://schemas.microsoft.com/office/drawing/2010/main" w="9525">
+                  <a14:hiddenLine xmlns:a14="http://schemas.microsoft.com/office/drawing/2010/main" xmlns="" w="9525">
                     <a:solidFill>
                       <a:srgbClr val="000000"/>
                     </a:solidFill>
@@ -10100,7 +10107,7 @@
               </a:ln>
               <a:extLst>
                 <a:ext uri="{91240B29-F687-4f45-9708-019B960494DF}">
-                  <a14:hiddenLine xmlns="" xmlns:a14="http://schemas.microsoft.com/office/drawing/2010/main" w="9525">
+                  <a14:hiddenLine xmlns:a14="http://schemas.microsoft.com/office/drawing/2010/main" xmlns="" w="9525">
                     <a:solidFill>
                       <a:srgbClr val="000000"/>
                     </a:solidFill>
@@ -10162,7 +10169,7 @@
               </a:ln>
               <a:extLst>
                 <a:ext uri="{91240B29-F687-4f45-9708-019B960494DF}">
-                  <a14:hiddenLine xmlns="" xmlns:a14="http://schemas.microsoft.com/office/drawing/2010/main" w="9525">
+                  <a14:hiddenLine xmlns:a14="http://schemas.microsoft.com/office/drawing/2010/main" xmlns="" w="9525">
                     <a:solidFill>
                       <a:srgbClr val="000000"/>
                     </a:solidFill>
@@ -10252,7 +10259,7 @@
               </a:ln>
               <a:extLst>
                 <a:ext uri="{91240B29-F687-4f45-9708-019B960494DF}">
-                  <a14:hiddenLine xmlns="" xmlns:a14="http://schemas.microsoft.com/office/drawing/2010/main" w="9525">
+                  <a14:hiddenLine xmlns:a14="http://schemas.microsoft.com/office/drawing/2010/main" xmlns="" w="9525">
                     <a:solidFill>
                       <a:srgbClr val="000000"/>
                     </a:solidFill>
@@ -10342,7 +10349,7 @@
               </a:ln>
               <a:extLst>
                 <a:ext uri="{91240B29-F687-4f45-9708-019B960494DF}">
-                  <a14:hiddenLine xmlns="" xmlns:a14="http://schemas.microsoft.com/office/drawing/2010/main" w="9525">
+                  <a14:hiddenLine xmlns:a14="http://schemas.microsoft.com/office/drawing/2010/main" xmlns="" w="9525">
                     <a:solidFill>
                       <a:srgbClr val="000000"/>
                     </a:solidFill>
@@ -10404,7 +10411,7 @@
               </a:ln>
               <a:extLst>
                 <a:ext uri="{91240B29-F687-4f45-9708-019B960494DF}">
-                  <a14:hiddenLine xmlns="" xmlns:a14="http://schemas.microsoft.com/office/drawing/2010/main" w="9525">
+                  <a14:hiddenLine xmlns:a14="http://schemas.microsoft.com/office/drawing/2010/main" xmlns="" w="9525">
                     <a:solidFill>
                       <a:srgbClr val="000000"/>
                     </a:solidFill>
@@ -10514,7 +10521,7 @@
               </a:ln>
               <a:extLst>
                 <a:ext uri="{91240B29-F687-4f45-9708-019B960494DF}">
-                  <a14:hiddenLine xmlns="" xmlns:a14="http://schemas.microsoft.com/office/drawing/2010/main" w="9525">
+                  <a14:hiddenLine xmlns:a14="http://schemas.microsoft.com/office/drawing/2010/main" xmlns="" w="9525">
                     <a:solidFill>
                       <a:srgbClr val="000000"/>
                     </a:solidFill>
@@ -10598,7 +10605,7 @@
               </a:ln>
               <a:extLst>
                 <a:ext uri="{91240B29-F687-4f45-9708-019B960494DF}">
-                  <a14:hiddenLine xmlns="" xmlns:a14="http://schemas.microsoft.com/office/drawing/2010/main" w="9525">
+                  <a14:hiddenLine xmlns:a14="http://schemas.microsoft.com/office/drawing/2010/main" xmlns="" w="9525">
                     <a:solidFill>
                       <a:srgbClr val="000000"/>
                     </a:solidFill>
@@ -10660,7 +10667,7 @@
               </a:ln>
               <a:extLst>
                 <a:ext uri="{91240B29-F687-4f45-9708-019B960494DF}">
-                  <a14:hiddenLine xmlns="" xmlns:a14="http://schemas.microsoft.com/office/drawing/2010/main" w="9525">
+                  <a14:hiddenLine xmlns:a14="http://schemas.microsoft.com/office/drawing/2010/main" xmlns="" w="9525">
                     <a:solidFill>
                       <a:srgbClr val="000000"/>
                     </a:solidFill>
@@ -10722,7 +10729,7 @@
               </a:ln>
               <a:extLst>
                 <a:ext uri="{91240B29-F687-4f45-9708-019B960494DF}">
-                  <a14:hiddenLine xmlns="" xmlns:a14="http://schemas.microsoft.com/office/drawing/2010/main" w="9525">
+                  <a14:hiddenLine xmlns:a14="http://schemas.microsoft.com/office/drawing/2010/main" xmlns="" w="9525">
                     <a:solidFill>
                       <a:srgbClr val="000000"/>
                     </a:solidFill>
@@ -10812,7 +10819,7 @@
               </a:ln>
               <a:extLst>
                 <a:ext uri="{91240B29-F687-4f45-9708-019B960494DF}">
-                  <a14:hiddenLine xmlns="" xmlns:a14="http://schemas.microsoft.com/office/drawing/2010/main" w="9525">
+                  <a14:hiddenLine xmlns:a14="http://schemas.microsoft.com/office/drawing/2010/main" xmlns="" w="9525">
                     <a:solidFill>
                       <a:srgbClr val="000000"/>
                     </a:solidFill>
@@ -10846,7 +10853,7 @@
               </a:ln>
               <a:extLst>
                 <a:ext uri="{91240B29-F687-4f45-9708-019B960494DF}">
-                  <a14:hiddenLine xmlns="" xmlns:a14="http://schemas.microsoft.com/office/drawing/2010/main" w="9525">
+                  <a14:hiddenLine xmlns:a14="http://schemas.microsoft.com/office/drawing/2010/main" xmlns="" w="9525">
                     <a:solidFill>
                       <a:srgbClr val="000000"/>
                     </a:solidFill>
@@ -10911,7 +10918,7 @@
               </a:ln>
               <a:extLst>
                 <a:ext uri="{91240B29-F687-4f45-9708-019B960494DF}">
-                  <a14:hiddenLine xmlns="" xmlns:a14="http://schemas.microsoft.com/office/drawing/2010/main" w="9525">
+                  <a14:hiddenLine xmlns:a14="http://schemas.microsoft.com/office/drawing/2010/main" xmlns="" w="9525">
                     <a:solidFill>
                       <a:srgbClr val="000000"/>
                     </a:solidFill>
@@ -11001,7 +11008,7 @@
               </a:ln>
               <a:extLst>
                 <a:ext uri="{91240B29-F687-4f45-9708-019B960494DF}">
-                  <a14:hiddenLine xmlns="" xmlns:a14="http://schemas.microsoft.com/office/drawing/2010/main" w="9525">
+                  <a14:hiddenLine xmlns:a14="http://schemas.microsoft.com/office/drawing/2010/main" xmlns="" w="9525">
                     <a:solidFill>
                       <a:srgbClr val="000000"/>
                     </a:solidFill>
@@ -11063,7 +11070,7 @@
               </a:ln>
               <a:extLst>
                 <a:ext uri="{91240B29-F687-4f45-9708-019B960494DF}">
-                  <a14:hiddenLine xmlns="" xmlns:a14="http://schemas.microsoft.com/office/drawing/2010/main" w="9525">
+                  <a14:hiddenLine xmlns:a14="http://schemas.microsoft.com/office/drawing/2010/main" xmlns="" w="9525">
                     <a:solidFill>
                       <a:srgbClr val="000000"/>
                     </a:solidFill>
@@ -11153,7 +11160,7 @@
               </a:ln>
               <a:extLst>
                 <a:ext uri="{91240B29-F687-4f45-9708-019B960494DF}">
-                  <a14:hiddenLine xmlns="" xmlns:a14="http://schemas.microsoft.com/office/drawing/2010/main" w="9525">
+                  <a14:hiddenLine xmlns:a14="http://schemas.microsoft.com/office/drawing/2010/main" xmlns="" w="9525">
                     <a:solidFill>
                       <a:srgbClr val="000000"/>
                     </a:solidFill>
@@ -11218,7 +11225,7 @@
               </a:ln>
               <a:extLst>
                 <a:ext uri="{91240B29-F687-4f45-9708-019B960494DF}">
-                  <a14:hiddenLine xmlns="" xmlns:a14="http://schemas.microsoft.com/office/drawing/2010/main" w="9525">
+                  <a14:hiddenLine xmlns:a14="http://schemas.microsoft.com/office/drawing/2010/main" xmlns="" w="9525">
                     <a:solidFill>
                       <a:srgbClr val="000000"/>
                     </a:solidFill>
@@ -11280,7 +11287,7 @@
               </a:ln>
               <a:extLst>
                 <a:ext uri="{91240B29-F687-4f45-9708-019B960494DF}">
-                  <a14:hiddenLine xmlns="" xmlns:a14="http://schemas.microsoft.com/office/drawing/2010/main" w="9525">
+                  <a14:hiddenLine xmlns:a14="http://schemas.microsoft.com/office/drawing/2010/main" xmlns="" w="9525">
                     <a:solidFill>
                       <a:srgbClr val="000000"/>
                     </a:solidFill>
@@ -11370,7 +11377,7 @@
               </a:ln>
               <a:extLst>
                 <a:ext uri="{91240B29-F687-4f45-9708-019B960494DF}">
-                  <a14:hiddenLine xmlns="" xmlns:a14="http://schemas.microsoft.com/office/drawing/2010/main" w="9525">
+                  <a14:hiddenLine xmlns:a14="http://schemas.microsoft.com/office/drawing/2010/main" xmlns="" w="9525">
                     <a:solidFill>
                       <a:srgbClr val="000000"/>
                     </a:solidFill>
@@ -11460,7 +11467,7 @@
               </a:ln>
               <a:extLst>
                 <a:ext uri="{91240B29-F687-4f45-9708-019B960494DF}">
-                  <a14:hiddenLine xmlns="" xmlns:a14="http://schemas.microsoft.com/office/drawing/2010/main" w="9525">
+                  <a14:hiddenLine xmlns:a14="http://schemas.microsoft.com/office/drawing/2010/main" xmlns="" w="9525">
                     <a:solidFill>
                       <a:srgbClr val="000000"/>
                     </a:solidFill>
@@ -11525,7 +11532,7 @@
               </a:ln>
               <a:extLst>
                 <a:ext uri="{91240B29-F687-4f45-9708-019B960494DF}">
-                  <a14:hiddenLine xmlns="" xmlns:a14="http://schemas.microsoft.com/office/drawing/2010/main" w="9525">
+                  <a14:hiddenLine xmlns:a14="http://schemas.microsoft.com/office/drawing/2010/main" xmlns="" w="9525">
                     <a:solidFill>
                       <a:srgbClr val="000000"/>
                     </a:solidFill>
@@ -11645,7 +11652,7 @@
               </a:ln>
               <a:extLst>
                 <a:ext uri="{91240B29-F687-4f45-9708-019B960494DF}">
-                  <a14:hiddenLine xmlns="" xmlns:a14="http://schemas.microsoft.com/office/drawing/2010/main" w="9525">
+                  <a14:hiddenLine xmlns:a14="http://schemas.microsoft.com/office/drawing/2010/main" xmlns="" w="9525">
                     <a:solidFill>
                       <a:srgbClr val="000000"/>
                     </a:solidFill>
@@ -11726,7 +11733,7 @@
               </a:ln>
               <a:extLst>
                 <a:ext uri="{91240B29-F687-4f45-9708-019B960494DF}">
-                  <a14:hiddenLine xmlns="" xmlns:a14="http://schemas.microsoft.com/office/drawing/2010/main" w="9525">
+                  <a14:hiddenLine xmlns:a14="http://schemas.microsoft.com/office/drawing/2010/main" xmlns="" w="9525">
                     <a:solidFill>
                       <a:srgbClr val="000000"/>
                     </a:solidFill>
@@ -11841,7 +11848,7 @@
               </a:ln>
               <a:extLst>
                 <a:ext uri="{91240B29-F687-4f45-9708-019B960494DF}">
-                  <a14:hiddenLine xmlns="" xmlns:a14="http://schemas.microsoft.com/office/drawing/2010/main" w="9525">
+                  <a14:hiddenLine xmlns:a14="http://schemas.microsoft.com/office/drawing/2010/main" xmlns="" w="9525">
                     <a:solidFill>
                       <a:srgbClr val="000000"/>
                     </a:solidFill>
@@ -11931,7 +11938,7 @@
               </a:ln>
               <a:extLst>
                 <a:ext uri="{91240B29-F687-4f45-9708-019B960494DF}">
-                  <a14:hiddenLine xmlns="" xmlns:a14="http://schemas.microsoft.com/office/drawing/2010/main" w="9525">
+                  <a14:hiddenLine xmlns:a14="http://schemas.microsoft.com/office/drawing/2010/main" xmlns="" w="9525">
                     <a:solidFill>
                       <a:srgbClr val="000000"/>
                     </a:solidFill>
@@ -11996,7 +12003,7 @@
               </a:ln>
               <a:extLst>
                 <a:ext uri="{91240B29-F687-4f45-9708-019B960494DF}">
-                  <a14:hiddenLine xmlns="" xmlns:a14="http://schemas.microsoft.com/office/drawing/2010/main" w="9525">
+                  <a14:hiddenLine xmlns:a14="http://schemas.microsoft.com/office/drawing/2010/main" xmlns="" w="9525">
                     <a:solidFill>
                       <a:srgbClr val="000000"/>
                     </a:solidFill>
@@ -12086,7 +12093,7 @@
               </a:ln>
               <a:extLst>
                 <a:ext uri="{91240B29-F687-4f45-9708-019B960494DF}">
-                  <a14:hiddenLine xmlns="" xmlns:a14="http://schemas.microsoft.com/office/drawing/2010/main" w="9525">
+                  <a14:hiddenLine xmlns:a14="http://schemas.microsoft.com/office/drawing/2010/main" xmlns="" w="9525">
                     <a:solidFill>
                       <a:srgbClr val="000000"/>
                     </a:solidFill>
@@ -12154,7 +12161,7 @@
               </a:ln>
               <a:extLst>
                 <a:ext uri="{91240B29-F687-4f45-9708-019B960494DF}">
-                  <a14:hiddenLine xmlns="" xmlns:a14="http://schemas.microsoft.com/office/drawing/2010/main" w="9525">
+                  <a14:hiddenLine xmlns:a14="http://schemas.microsoft.com/office/drawing/2010/main" xmlns="" w="9525">
                     <a:solidFill>
                       <a:srgbClr val="000000"/>
                     </a:solidFill>
@@ -12244,7 +12251,7 @@
               </a:ln>
               <a:extLst>
                 <a:ext uri="{91240B29-F687-4f45-9708-019B960494DF}">
-                  <a14:hiddenLine xmlns="" xmlns:a14="http://schemas.microsoft.com/office/drawing/2010/main" w="9525">
+                  <a14:hiddenLine xmlns:a14="http://schemas.microsoft.com/office/drawing/2010/main" xmlns="" w="9525">
                     <a:solidFill>
                       <a:srgbClr val="000000"/>
                     </a:solidFill>
@@ -12312,7 +12319,7 @@
               </a:ln>
               <a:extLst>
                 <a:ext uri="{91240B29-F687-4f45-9708-019B960494DF}">
-                  <a14:hiddenLine xmlns="" xmlns:a14="http://schemas.microsoft.com/office/drawing/2010/main" w="9525">
+                  <a14:hiddenLine xmlns:a14="http://schemas.microsoft.com/office/drawing/2010/main" xmlns="" w="9525">
                     <a:solidFill>
                       <a:srgbClr val="000000"/>
                     </a:solidFill>
@@ -12402,7 +12409,7 @@
               </a:ln>
               <a:extLst>
                 <a:ext uri="{91240B29-F687-4f45-9708-019B960494DF}">
-                  <a14:hiddenLine xmlns="" xmlns:a14="http://schemas.microsoft.com/office/drawing/2010/main" w="9525">
+                  <a14:hiddenLine xmlns:a14="http://schemas.microsoft.com/office/drawing/2010/main" xmlns="" w="9525">
                     <a:solidFill>
                       <a:srgbClr val="000000"/>
                     </a:solidFill>
@@ -12436,7 +12443,7 @@
               </a:ln>
               <a:extLst>
                 <a:ext uri="{91240B29-F687-4f45-9708-019B960494DF}">
-                  <a14:hiddenLine xmlns="" xmlns:a14="http://schemas.microsoft.com/office/drawing/2010/main" w="9525">
+                  <a14:hiddenLine xmlns:a14="http://schemas.microsoft.com/office/drawing/2010/main" xmlns="" w="9525">
                     <a:solidFill>
                       <a:srgbClr val="000000"/>
                     </a:solidFill>
@@ -14070,7 +14077,7 @@
           <p:cNvPr id="2" name="Title 1">
             <a:extLst>
               <a:ext uri="{FF2B5EF4-FFF2-40B4-BE49-F238E27FC236}">
-                <a16:creationId xmlns:a16="http://schemas.microsoft.com/office/drawing/2014/main" id="{C7AB3235-CCE8-46E6-BDE8-EF71E09B00DA}"/>
+                <a16:creationId xmlns:a16="http://schemas.microsoft.com/office/drawing/2014/main" id="{56B0ED3F-B8C2-4C79-B981-217056E83BA3}"/>
               </a:ext>
             </a:extLst>
           </p:cNvPr>
@@ -14088,7 +14095,7 @@
           <a:p>
             <a:r>
               <a:rPr lang="en-US" dirty="0"/>
-              <a:t>Presentation End – open lab and questions</a:t>
+              <a:t>Forking workflow</a:t>
             </a:r>
           </a:p>
         </p:txBody>
@@ -14098,7 +14105,7 @@
           <p:cNvPr id="3" name="Content Placeholder 2">
             <a:extLst>
               <a:ext uri="{FF2B5EF4-FFF2-40B4-BE49-F238E27FC236}">
-                <a16:creationId xmlns:a16="http://schemas.microsoft.com/office/drawing/2014/main" id="{3A9669AB-E7B2-4895-9E7F-B06438F6702B}"/>
+                <a16:creationId xmlns:a16="http://schemas.microsoft.com/office/drawing/2014/main" id="{34190D32-8CFA-4160-B4EA-9C4BF3CC222B}"/>
               </a:ext>
             </a:extLst>
           </p:cNvPr>
@@ -14116,46 +14123,154 @@
           <a:p>
             <a:r>
               <a:rPr lang="en-US" dirty="0"/>
-              <a:t>Can’t think of a question or need to leave before I can answer?</a:t>
-            </a:r>
-          </a:p>
-          <a:p>
-            <a:pPr lvl="1"/>
+              <a:t>The Forking Workflow is most often seen in public open source projects.</a:t>
+            </a:r>
+          </a:p>
+          <a:p>
             <a:r>
               <a:rPr lang="en-US" dirty="0"/>
-              <a:t>No worries! Send me an email – </a:t>
-            </a:r>
-            <a:r>
-              <a:rPr lang="en-US" dirty="0">
-                <a:solidFill>
-                  <a:schemeClr val="tx1">
-                    <a:lumMod val="95000"/>
-                  </a:schemeClr>
-                </a:solidFill>
-                <a:hlinkClick r:id="rId2">
-                  <a:extLst>
-                    <a:ext uri="{A12FA001-AC4F-418D-AE19-62706E023703}">
-                      <ahyp:hlinkClr xmlns:ahyp="http://schemas.microsoft.com/office/drawing/2018/hyperlinkcolor" val="tx"/>
-                    </a:ext>
-                  </a:extLst>
-                </a:hlinkClick>
-              </a:rPr>
-              <a:t>zach@zach-martin.com</a:t>
-            </a:r>
-            <a:endParaRPr lang="en-US" dirty="0">
-              <a:solidFill>
-                <a:schemeClr val="tx1">
-                  <a:lumMod val="95000"/>
-                </a:schemeClr>
-              </a:solidFill>
-            </a:endParaRPr>
+              <a:t>The main advantage is that contributions can be integrated without the need for everybody to push to a single central repository</a:t>
+            </a:r>
+          </a:p>
+          <a:p>
+            <a:endParaRPr lang="en-US" dirty="0"/>
+          </a:p>
+        </p:txBody>
+      </p:sp>
+      <p:pic>
+        <p:nvPicPr>
+          <p:cNvPr id="5" name="Picture 4">
+            <a:extLst>
+              <a:ext uri="{FF2B5EF4-FFF2-40B4-BE49-F238E27FC236}">
+                <a16:creationId xmlns:a16="http://schemas.microsoft.com/office/drawing/2014/main" id="{0292C6D5-4353-47B9-BA99-2A86B69B9841}"/>
+              </a:ext>
+            </a:extLst>
+          </p:cNvPr>
+          <p:cNvPicPr>
+            <a:picLocks noChangeAspect="1"/>
+          </p:cNvPicPr>
+          <p:nvPr/>
+        </p:nvPicPr>
+        <p:blipFill>
+          <a:blip r:embed="rId2"/>
+          <a:stretch>
+            <a:fillRect/>
+          </a:stretch>
+        </p:blipFill>
+        <p:spPr>
+          <a:xfrm>
+            <a:off x="3094037" y="4451034"/>
+            <a:ext cx="6000748" cy="1340167"/>
+          </a:xfrm>
+          <a:prstGeom prst="rect">
+            <a:avLst/>
+          </a:prstGeom>
+        </p:spPr>
+      </p:pic>
+    </p:spTree>
+    <p:extLst>
+      <p:ext uri="{BB962C8B-B14F-4D97-AF65-F5344CB8AC3E}">
+        <p14:creationId xmlns:p14="http://schemas.microsoft.com/office/powerpoint/2010/main" val="1375465902"/>
+      </p:ext>
+    </p:extLst>
+  </p:cSld>
+  <p:clrMapOvr>
+    <a:masterClrMapping/>
+  </p:clrMapOvr>
+</p:sld>
+</file>
+
+<file path=ppt/slides/slide19.xml><?xml version="1.0" encoding="utf-8"?>
+<p:sld xmlns:a="http://schemas.openxmlformats.org/drawingml/2006/main" xmlns:r="http://schemas.openxmlformats.org/officeDocument/2006/relationships" xmlns:p="http://schemas.openxmlformats.org/presentationml/2006/main">
+  <p:cSld>
+    <p:spTree>
+      <p:nvGrpSpPr>
+        <p:cNvPr id="1" name=""/>
+        <p:cNvGrpSpPr/>
+        <p:nvPr/>
+      </p:nvGrpSpPr>
+      <p:grpSpPr>
+        <a:xfrm>
+          <a:off x="0" y="0"/>
+          <a:ext cx="0" cy="0"/>
+          <a:chOff x="0" y="0"/>
+          <a:chExt cx="0" cy="0"/>
+        </a:xfrm>
+      </p:grpSpPr>
+      <p:sp>
+        <p:nvSpPr>
+          <p:cNvPr id="2" name="Title 1">
+            <a:extLst>
+              <a:ext uri="{FF2B5EF4-FFF2-40B4-BE49-F238E27FC236}">
+                <a16:creationId xmlns:a16="http://schemas.microsoft.com/office/drawing/2014/main" id="{E7A3A6D1-66C8-44C6-98FB-76A530D9ECC2}"/>
+              </a:ext>
+            </a:extLst>
+          </p:cNvPr>
+          <p:cNvSpPr>
+            <a:spLocks noGrp="1"/>
+          </p:cNvSpPr>
+          <p:nvPr>
+            <p:ph type="title"/>
+          </p:nvPr>
+        </p:nvSpPr>
+        <p:spPr/>
+        <p:txBody>
+          <a:bodyPr/>
+          <a:lstStyle/>
+          <a:p>
+            <a:r>
+              <a:rPr lang="en-US" dirty="0"/>
+              <a:t>Branching differences</a:t>
+            </a:r>
+          </a:p>
+        </p:txBody>
+      </p:sp>
+      <p:sp>
+        <p:nvSpPr>
+          <p:cNvPr id="3" name="Content Placeholder 2">
+            <a:extLst>
+              <a:ext uri="{FF2B5EF4-FFF2-40B4-BE49-F238E27FC236}">
+                <a16:creationId xmlns:a16="http://schemas.microsoft.com/office/drawing/2014/main" id="{3FFE1642-BC9F-4B01-A237-1732BC79D756}"/>
+              </a:ext>
+            </a:extLst>
+          </p:cNvPr>
+          <p:cNvSpPr>
+            <a:spLocks noGrp="1"/>
+          </p:cNvSpPr>
+          <p:nvPr>
+            <p:ph idx="1"/>
+          </p:nvPr>
+        </p:nvSpPr>
+        <p:spPr/>
+        <p:txBody>
+          <a:bodyPr/>
+          <a:lstStyle/>
+          <a:p>
+            <a:r>
+              <a:rPr lang="en-US" dirty="0"/>
+              <a:t>Everybody should still be using branches to isolate individual features, the only difference is how those branches get  shared.</a:t>
+            </a:r>
+          </a:p>
+          <a:p>
+            <a:r>
+              <a:rPr lang="en-US" dirty="0"/>
+              <a:t>In the Forking Workflow, they are pulled into another developer’s local repository, while in the Feature Branch and </a:t>
+            </a:r>
+            <a:r>
+              <a:rPr lang="en-US" dirty="0" err="1"/>
+              <a:t>Gitflow</a:t>
+            </a:r>
+            <a:r>
+              <a:rPr lang="en-US" dirty="0"/>
+              <a:t> Workflows they are pushed to the official repository.</a:t>
+            </a:r>
           </a:p>
         </p:txBody>
       </p:sp>
     </p:spTree>
     <p:extLst>
       <p:ext uri="{BB962C8B-B14F-4D97-AF65-F5344CB8AC3E}">
-        <p14:creationId xmlns:p14="http://schemas.microsoft.com/office/powerpoint/2010/main" val="3460011935"/>
+        <p14:creationId xmlns:p14="http://schemas.microsoft.com/office/powerpoint/2010/main" val="2391448022"/>
       </p:ext>
     </p:extLst>
   </p:cSld>
@@ -14374,6 +14489,686 @@
     <p:extLst>
       <p:ext uri="{BB962C8B-B14F-4D97-AF65-F5344CB8AC3E}">
         <p14:creationId xmlns:p14="http://schemas.microsoft.com/office/powerpoint/2010/main" val="2172179498"/>
+      </p:ext>
+    </p:extLst>
+  </p:cSld>
+  <p:clrMapOvr>
+    <a:masterClrMapping/>
+  </p:clrMapOvr>
+</p:sld>
+</file>
+
+<file path=ppt/slides/slide20.xml><?xml version="1.0" encoding="utf-8"?>
+<p:sld xmlns:a="http://schemas.openxmlformats.org/drawingml/2006/main" xmlns:r="http://schemas.openxmlformats.org/officeDocument/2006/relationships" xmlns:p="http://schemas.openxmlformats.org/presentationml/2006/main">
+  <p:cSld>
+    <p:spTree>
+      <p:nvGrpSpPr>
+        <p:cNvPr id="1" name=""/>
+        <p:cNvGrpSpPr/>
+        <p:nvPr/>
+      </p:nvGrpSpPr>
+      <p:grpSpPr>
+        <a:xfrm>
+          <a:off x="0" y="0"/>
+          <a:ext cx="0" cy="0"/>
+          <a:chOff x="0" y="0"/>
+          <a:chExt cx="0" cy="0"/>
+        </a:xfrm>
+      </p:grpSpPr>
+      <p:sp>
+        <p:nvSpPr>
+          <p:cNvPr id="2" name="Title 1">
+            <a:extLst>
+              <a:ext uri="{FF2B5EF4-FFF2-40B4-BE49-F238E27FC236}">
+                <a16:creationId xmlns:a16="http://schemas.microsoft.com/office/drawing/2014/main" id="{A8FA8C29-1A2A-4871-8FF6-E4331B6CEA52}"/>
+              </a:ext>
+            </a:extLst>
+          </p:cNvPr>
+          <p:cNvSpPr>
+            <a:spLocks noGrp="1"/>
+          </p:cNvSpPr>
+          <p:nvPr>
+            <p:ph type="title"/>
+          </p:nvPr>
+        </p:nvSpPr>
+        <p:spPr/>
+        <p:txBody>
+          <a:bodyPr/>
+          <a:lstStyle/>
+          <a:p>
+            <a:r>
+              <a:rPr lang="en-US" dirty="0"/>
+              <a:t>Getting started</a:t>
+            </a:r>
+          </a:p>
+        </p:txBody>
+      </p:sp>
+      <p:sp>
+        <p:nvSpPr>
+          <p:cNvPr id="3" name="Content Placeholder 2">
+            <a:extLst>
+              <a:ext uri="{FF2B5EF4-FFF2-40B4-BE49-F238E27FC236}">
+                <a16:creationId xmlns:a16="http://schemas.microsoft.com/office/drawing/2014/main" id="{55835F02-02AE-4439-8E8E-2F03C55CFE77}"/>
+              </a:ext>
+            </a:extLst>
+          </p:cNvPr>
+          <p:cNvSpPr>
+            <a:spLocks noGrp="1"/>
+          </p:cNvSpPr>
+          <p:nvPr>
+            <p:ph idx="1"/>
+          </p:nvPr>
+        </p:nvSpPr>
+        <p:spPr/>
+        <p:txBody>
+          <a:bodyPr/>
+          <a:lstStyle/>
+          <a:p>
+            <a:r>
+              <a:rPr lang="en-US" dirty="0"/>
+              <a:t>All new developers to a Forking Workflow project need to fork the official repository</a:t>
+            </a:r>
+          </a:p>
+          <a:p>
+            <a:r>
+              <a:rPr lang="en-US" dirty="0"/>
+              <a:t>Forking is just a standard git clone operation</a:t>
+            </a:r>
+          </a:p>
+          <a:p>
+            <a:r>
+              <a:rPr lang="en-US" dirty="0"/>
+              <a:t>This will clone the original repository to our own server-side repository</a:t>
+            </a:r>
+          </a:p>
+          <a:p>
+            <a:r>
+              <a:rPr lang="en-US" dirty="0"/>
+              <a:t>Git hosting services automate this step without the need of </a:t>
+            </a:r>
+            <a:r>
+              <a:rPr lang="en-US" dirty="0" err="1"/>
+              <a:t>SSH’ing</a:t>
+            </a:r>
+            <a:r>
+              <a:rPr lang="en-US" dirty="0"/>
+              <a:t> into a server to clone</a:t>
+            </a:r>
+          </a:p>
+        </p:txBody>
+      </p:sp>
+    </p:spTree>
+    <p:extLst>
+      <p:ext uri="{BB962C8B-B14F-4D97-AF65-F5344CB8AC3E}">
+        <p14:creationId xmlns:p14="http://schemas.microsoft.com/office/powerpoint/2010/main" val="2254951386"/>
+      </p:ext>
+    </p:extLst>
+  </p:cSld>
+  <p:clrMapOvr>
+    <a:masterClrMapping/>
+  </p:clrMapOvr>
+</p:sld>
+</file>
+
+<file path=ppt/slides/slide21.xml><?xml version="1.0" encoding="utf-8"?>
+<p:sld xmlns:a="http://schemas.openxmlformats.org/drawingml/2006/main" xmlns:r="http://schemas.openxmlformats.org/officeDocument/2006/relationships" xmlns:p="http://schemas.openxmlformats.org/presentationml/2006/main">
+  <p:cSld>
+    <p:spTree>
+      <p:nvGrpSpPr>
+        <p:cNvPr id="1" name=""/>
+        <p:cNvGrpSpPr/>
+        <p:nvPr/>
+      </p:nvGrpSpPr>
+      <p:grpSpPr>
+        <a:xfrm>
+          <a:off x="0" y="0"/>
+          <a:ext cx="0" cy="0"/>
+          <a:chOff x="0" y="0"/>
+          <a:chExt cx="0" cy="0"/>
+        </a:xfrm>
+      </p:grpSpPr>
+      <p:sp>
+        <p:nvSpPr>
+          <p:cNvPr id="2" name="Title 1">
+            <a:extLst>
+              <a:ext uri="{FF2B5EF4-FFF2-40B4-BE49-F238E27FC236}">
+                <a16:creationId xmlns:a16="http://schemas.microsoft.com/office/drawing/2014/main" id="{189ECE41-5CBE-4823-A2D4-75C0D66245FC}"/>
+              </a:ext>
+            </a:extLst>
+          </p:cNvPr>
+          <p:cNvSpPr>
+            <a:spLocks noGrp="1"/>
+          </p:cNvSpPr>
+          <p:nvPr>
+            <p:ph type="title"/>
+          </p:nvPr>
+        </p:nvSpPr>
+        <p:spPr/>
+        <p:txBody>
+          <a:bodyPr/>
+          <a:lstStyle/>
+          <a:p>
+            <a:r>
+              <a:rPr lang="en-US" dirty="0"/>
+              <a:t>Clone your fork</a:t>
+            </a:r>
+          </a:p>
+        </p:txBody>
+      </p:sp>
+      <p:sp>
+        <p:nvSpPr>
+          <p:cNvPr id="3" name="Content Placeholder 2">
+            <a:extLst>
+              <a:ext uri="{FF2B5EF4-FFF2-40B4-BE49-F238E27FC236}">
+                <a16:creationId xmlns:a16="http://schemas.microsoft.com/office/drawing/2014/main" id="{79A7F064-E54D-486C-8916-AD49218D22F8}"/>
+              </a:ext>
+            </a:extLst>
+          </p:cNvPr>
+          <p:cNvSpPr>
+            <a:spLocks noGrp="1"/>
+          </p:cNvSpPr>
+          <p:nvPr>
+            <p:ph idx="1"/>
+          </p:nvPr>
+        </p:nvSpPr>
+        <p:spPr/>
+        <p:txBody>
+          <a:bodyPr/>
+          <a:lstStyle/>
+          <a:p>
+            <a:r>
+              <a:rPr lang="en-US" dirty="0"/>
+              <a:t>Clone your own public forked repo</a:t>
+            </a:r>
+          </a:p>
+          <a:p>
+            <a:r>
+              <a:rPr lang="en-US" dirty="0"/>
+              <a:t>This can be done with the familiar git clone command</a:t>
+            </a:r>
+          </a:p>
+          <a:p>
+            <a:r>
+              <a:rPr lang="en-US" dirty="0"/>
+              <a:t>Git clone https://github.com/user/repo.git</a:t>
+            </a:r>
+          </a:p>
+        </p:txBody>
+      </p:sp>
+    </p:spTree>
+    <p:extLst>
+      <p:ext uri="{BB962C8B-B14F-4D97-AF65-F5344CB8AC3E}">
+        <p14:creationId xmlns:p14="http://schemas.microsoft.com/office/powerpoint/2010/main" val="1256485116"/>
+      </p:ext>
+    </p:extLst>
+  </p:cSld>
+  <p:clrMapOvr>
+    <a:masterClrMapping/>
+  </p:clrMapOvr>
+</p:sld>
+</file>
+
+<file path=ppt/slides/slide22.xml><?xml version="1.0" encoding="utf-8"?>
+<p:sld xmlns:a="http://schemas.openxmlformats.org/drawingml/2006/main" xmlns:r="http://schemas.openxmlformats.org/officeDocument/2006/relationships" xmlns:p="http://schemas.openxmlformats.org/presentationml/2006/main">
+  <p:cSld>
+    <p:spTree>
+      <p:nvGrpSpPr>
+        <p:cNvPr id="1" name=""/>
+        <p:cNvGrpSpPr/>
+        <p:nvPr/>
+      </p:nvGrpSpPr>
+      <p:grpSpPr>
+        <a:xfrm>
+          <a:off x="0" y="0"/>
+          <a:ext cx="0" cy="0"/>
+          <a:chOff x="0" y="0"/>
+          <a:chExt cx="0" cy="0"/>
+        </a:xfrm>
+      </p:grpSpPr>
+      <p:sp>
+        <p:nvSpPr>
+          <p:cNvPr id="2" name="Title 1">
+            <a:extLst>
+              <a:ext uri="{FF2B5EF4-FFF2-40B4-BE49-F238E27FC236}">
+                <a16:creationId xmlns:a16="http://schemas.microsoft.com/office/drawing/2014/main" id="{6C5BC028-67C3-4959-BA86-7D4751ADBC8E}"/>
+              </a:ext>
+            </a:extLst>
+          </p:cNvPr>
+          <p:cNvSpPr>
+            <a:spLocks noGrp="1"/>
+          </p:cNvSpPr>
+          <p:nvPr>
+            <p:ph type="title"/>
+          </p:nvPr>
+        </p:nvSpPr>
+        <p:spPr/>
+        <p:txBody>
+          <a:bodyPr/>
+          <a:lstStyle/>
+          <a:p>
+            <a:r>
+              <a:rPr lang="en-US" dirty="0"/>
+              <a:t>Adding a remote</a:t>
+            </a:r>
+          </a:p>
+        </p:txBody>
+      </p:sp>
+      <p:sp>
+        <p:nvSpPr>
+          <p:cNvPr id="3" name="Content Placeholder 2">
+            <a:extLst>
+              <a:ext uri="{FF2B5EF4-FFF2-40B4-BE49-F238E27FC236}">
+                <a16:creationId xmlns:a16="http://schemas.microsoft.com/office/drawing/2014/main" id="{B643AAAB-04D8-4324-81AB-4604FABB748C}"/>
+              </a:ext>
+            </a:extLst>
+          </p:cNvPr>
+          <p:cNvSpPr>
+            <a:spLocks noGrp="1"/>
+          </p:cNvSpPr>
+          <p:nvPr>
+            <p:ph idx="1"/>
+          </p:nvPr>
+        </p:nvSpPr>
+        <p:spPr/>
+        <p:txBody>
+          <a:bodyPr>
+            <a:normAutofit lnSpcReduction="10000"/>
+          </a:bodyPr>
+          <a:lstStyle/>
+          <a:p>
+            <a:r>
+              <a:rPr lang="en-US" dirty="0"/>
+              <a:t>The Forking Workflow requires two remotes</a:t>
+            </a:r>
+          </a:p>
+          <a:p>
+            <a:pPr lvl="1"/>
+            <a:r>
+              <a:rPr lang="en-US" dirty="0"/>
+              <a:t>one for the official repository</a:t>
+            </a:r>
+          </a:p>
+          <a:p>
+            <a:pPr lvl="1"/>
+            <a:r>
+              <a:rPr lang="en-US" dirty="0"/>
+              <a:t>one for the developer’s personal server-side repository</a:t>
+            </a:r>
+          </a:p>
+          <a:p>
+            <a:r>
+              <a:rPr lang="en-US" dirty="0"/>
+              <a:t>A common naming convention is to </a:t>
+            </a:r>
+          </a:p>
+          <a:p>
+            <a:pPr lvl="1"/>
+            <a:r>
+              <a:rPr lang="en-US" dirty="0"/>
+              <a:t>use origin as the remote for your forked repository </a:t>
+            </a:r>
+          </a:p>
+          <a:p>
+            <a:pPr lvl="2"/>
+            <a:r>
+              <a:rPr lang="en-US" dirty="0"/>
+              <a:t>This will be created automatically when you run git clone</a:t>
+            </a:r>
+          </a:p>
+          <a:p>
+            <a:pPr lvl="1"/>
+            <a:r>
+              <a:rPr lang="en-US" dirty="0"/>
+              <a:t>upstream for the official repository</a:t>
+            </a:r>
+          </a:p>
+          <a:p>
+            <a:r>
+              <a:rPr lang="en-US" dirty="0"/>
+              <a:t>git remote add upstream https://github.com/user/repo.git</a:t>
+            </a:r>
+          </a:p>
+        </p:txBody>
+      </p:sp>
+    </p:spTree>
+    <p:extLst>
+      <p:ext uri="{BB962C8B-B14F-4D97-AF65-F5344CB8AC3E}">
+        <p14:creationId xmlns:p14="http://schemas.microsoft.com/office/powerpoint/2010/main" val="4047586881"/>
+      </p:ext>
+    </p:extLst>
+  </p:cSld>
+  <p:clrMapOvr>
+    <a:masterClrMapping/>
+  </p:clrMapOvr>
+</p:sld>
+</file>
+
+<file path=ppt/slides/slide23.xml><?xml version="1.0" encoding="utf-8"?>
+<p:sld xmlns:a="http://schemas.openxmlformats.org/drawingml/2006/main" xmlns:r="http://schemas.openxmlformats.org/officeDocument/2006/relationships" xmlns:p="http://schemas.openxmlformats.org/presentationml/2006/main">
+  <p:cSld>
+    <p:spTree>
+      <p:nvGrpSpPr>
+        <p:cNvPr id="1" name=""/>
+        <p:cNvGrpSpPr/>
+        <p:nvPr/>
+      </p:nvGrpSpPr>
+      <p:grpSpPr>
+        <a:xfrm>
+          <a:off x="0" y="0"/>
+          <a:ext cx="0" cy="0"/>
+          <a:chOff x="0" y="0"/>
+          <a:chExt cx="0" cy="0"/>
+        </a:xfrm>
+      </p:grpSpPr>
+      <p:sp>
+        <p:nvSpPr>
+          <p:cNvPr id="2" name="Title 1">
+            <a:extLst>
+              <a:ext uri="{FF2B5EF4-FFF2-40B4-BE49-F238E27FC236}">
+                <a16:creationId xmlns:a16="http://schemas.microsoft.com/office/drawing/2014/main" id="{EA10D8D4-3DB2-4A9E-B755-952620E4FBCE}"/>
+              </a:ext>
+            </a:extLst>
+          </p:cNvPr>
+          <p:cNvSpPr>
+            <a:spLocks noGrp="1"/>
+          </p:cNvSpPr>
+          <p:nvPr>
+            <p:ph type="title"/>
+          </p:nvPr>
+        </p:nvSpPr>
+        <p:spPr/>
+        <p:txBody>
+          <a:bodyPr/>
+          <a:lstStyle/>
+          <a:p>
+            <a:r>
+              <a:rPr lang="en-US" dirty="0"/>
+              <a:t>Making changes</a:t>
+            </a:r>
+          </a:p>
+        </p:txBody>
+      </p:sp>
+      <p:sp>
+        <p:nvSpPr>
+          <p:cNvPr id="3" name="Content Placeholder 2">
+            <a:extLst>
+              <a:ext uri="{FF2B5EF4-FFF2-40B4-BE49-F238E27FC236}">
+                <a16:creationId xmlns:a16="http://schemas.microsoft.com/office/drawing/2014/main" id="{E677DBBD-548C-40CB-9AB7-6CF4480001E9}"/>
+              </a:ext>
+            </a:extLst>
+          </p:cNvPr>
+          <p:cNvSpPr>
+            <a:spLocks noGrp="1"/>
+          </p:cNvSpPr>
+          <p:nvPr>
+            <p:ph idx="1"/>
+          </p:nvPr>
+        </p:nvSpPr>
+        <p:spPr/>
+        <p:txBody>
+          <a:bodyPr/>
+          <a:lstStyle/>
+          <a:p>
+            <a:r>
+              <a:rPr lang="en-US" dirty="0"/>
+              <a:t>In your local copy of the forked repository, you can edit code, commit changes, and create branches just like in other Git workflows</a:t>
+            </a:r>
+          </a:p>
+          <a:p>
+            <a:r>
+              <a:rPr lang="en-US" dirty="0"/>
+              <a:t>If the official repo has moved forward, you can get the latest change with “git pull upstream master”</a:t>
+            </a:r>
+          </a:p>
+          <a:p>
+            <a:endParaRPr lang="en-US" dirty="0"/>
+          </a:p>
+        </p:txBody>
+      </p:sp>
+    </p:spTree>
+    <p:extLst>
+      <p:ext uri="{BB962C8B-B14F-4D97-AF65-F5344CB8AC3E}">
+        <p14:creationId xmlns:p14="http://schemas.microsoft.com/office/powerpoint/2010/main" val="3070824342"/>
+      </p:ext>
+    </p:extLst>
+  </p:cSld>
+  <p:clrMapOvr>
+    <a:masterClrMapping/>
+  </p:clrMapOvr>
+</p:sld>
+</file>
+
+<file path=ppt/slides/slide24.xml><?xml version="1.0" encoding="utf-8"?>
+<p:sld xmlns:a="http://schemas.openxmlformats.org/drawingml/2006/main" xmlns:r="http://schemas.openxmlformats.org/officeDocument/2006/relationships" xmlns:p="http://schemas.openxmlformats.org/presentationml/2006/main">
+  <p:cSld>
+    <p:spTree>
+      <p:nvGrpSpPr>
+        <p:cNvPr id="1" name=""/>
+        <p:cNvGrpSpPr/>
+        <p:nvPr/>
+      </p:nvGrpSpPr>
+      <p:grpSpPr>
+        <a:xfrm>
+          <a:off x="0" y="0"/>
+          <a:ext cx="0" cy="0"/>
+          <a:chOff x="0" y="0"/>
+          <a:chExt cx="0" cy="0"/>
+        </a:xfrm>
+      </p:grpSpPr>
+      <p:sp>
+        <p:nvSpPr>
+          <p:cNvPr id="2" name="Title 1">
+            <a:extLst>
+              <a:ext uri="{FF2B5EF4-FFF2-40B4-BE49-F238E27FC236}">
+                <a16:creationId xmlns:a16="http://schemas.microsoft.com/office/drawing/2014/main" id="{2FF5F1A7-7492-4B3B-94F1-38DF60968C63}"/>
+              </a:ext>
+            </a:extLst>
+          </p:cNvPr>
+          <p:cNvSpPr>
+            <a:spLocks noGrp="1"/>
+          </p:cNvSpPr>
+          <p:nvPr>
+            <p:ph type="title"/>
+          </p:nvPr>
+        </p:nvSpPr>
+        <p:spPr/>
+        <p:txBody>
+          <a:bodyPr/>
+          <a:lstStyle/>
+          <a:p>
+            <a:r>
+              <a:rPr lang="en-US" dirty="0"/>
+              <a:t>Making a Pull Request</a:t>
+            </a:r>
+          </a:p>
+        </p:txBody>
+      </p:sp>
+      <p:sp>
+        <p:nvSpPr>
+          <p:cNvPr id="3" name="Content Placeholder 2">
+            <a:extLst>
+              <a:ext uri="{FF2B5EF4-FFF2-40B4-BE49-F238E27FC236}">
+                <a16:creationId xmlns:a16="http://schemas.microsoft.com/office/drawing/2014/main" id="{DE953982-2FE6-44C1-9909-79DAEF6E5045}"/>
+              </a:ext>
+            </a:extLst>
+          </p:cNvPr>
+          <p:cNvSpPr>
+            <a:spLocks noGrp="1"/>
+          </p:cNvSpPr>
+          <p:nvPr>
+            <p:ph idx="1"/>
+          </p:nvPr>
+        </p:nvSpPr>
+        <p:spPr/>
+        <p:txBody>
+          <a:bodyPr>
+            <a:normAutofit fontScale="77500" lnSpcReduction="20000"/>
+          </a:bodyPr>
+          <a:lstStyle/>
+          <a:p>
+            <a:r>
+              <a:rPr lang="en-US" dirty="0"/>
+              <a:t>Now you’re ready to make your new feature available!</a:t>
+            </a:r>
+          </a:p>
+          <a:p>
+            <a:r>
+              <a:rPr lang="en-US" dirty="0"/>
+              <a:t>First, you have to make your contribution accessible to other developers by pushing it to their public repository</a:t>
+            </a:r>
+          </a:p>
+          <a:p>
+            <a:pPr lvl="1"/>
+            <a:r>
+              <a:rPr lang="en-US" dirty="0"/>
+              <a:t>git push origin feature-branch</a:t>
+            </a:r>
+          </a:p>
+          <a:p>
+            <a:r>
+              <a:rPr lang="en-US" dirty="0"/>
+              <a:t>Second, you need to notify the project maintainer that they want to merge their feature into the official codebase</a:t>
+            </a:r>
+          </a:p>
+          <a:p>
+            <a:r>
+              <a:rPr lang="en-US" dirty="0" err="1"/>
+              <a:t>Github</a:t>
+            </a:r>
+            <a:r>
+              <a:rPr lang="en-US" dirty="0"/>
+              <a:t> provides a “new pull request” button that leads to a form asking you to specify which branch you want to merge into the official repository.</a:t>
+            </a:r>
+          </a:p>
+          <a:p>
+            <a:r>
+              <a:rPr lang="en-US" dirty="0"/>
+              <a:t>Typically, you’ll want to integrate your feature branch into the upstream remote’s master branch.</a:t>
+            </a:r>
+          </a:p>
+        </p:txBody>
+      </p:sp>
+    </p:spTree>
+    <p:extLst>
+      <p:ext uri="{BB962C8B-B14F-4D97-AF65-F5344CB8AC3E}">
+        <p14:creationId xmlns:p14="http://schemas.microsoft.com/office/powerpoint/2010/main" val="994643470"/>
+      </p:ext>
+    </p:extLst>
+  </p:cSld>
+  <p:clrMapOvr>
+    <a:masterClrMapping/>
+  </p:clrMapOvr>
+</p:sld>
+</file>
+
+<file path=ppt/slides/slide25.xml><?xml version="1.0" encoding="utf-8"?>
+<p:sld xmlns:a="http://schemas.openxmlformats.org/drawingml/2006/main" xmlns:r="http://schemas.openxmlformats.org/officeDocument/2006/relationships" xmlns:p="http://schemas.openxmlformats.org/presentationml/2006/main">
+  <p:cSld>
+    <p:spTree>
+      <p:nvGrpSpPr>
+        <p:cNvPr id="1" name=""/>
+        <p:cNvGrpSpPr/>
+        <p:nvPr/>
+      </p:nvGrpSpPr>
+      <p:grpSpPr>
+        <a:xfrm>
+          <a:off x="0" y="0"/>
+          <a:ext cx="0" cy="0"/>
+          <a:chOff x="0" y="0"/>
+          <a:chExt cx="0" cy="0"/>
+        </a:xfrm>
+      </p:grpSpPr>
+      <p:sp>
+        <p:nvSpPr>
+          <p:cNvPr id="2" name="Title 1">
+            <a:extLst>
+              <a:ext uri="{FF2B5EF4-FFF2-40B4-BE49-F238E27FC236}">
+                <a16:creationId xmlns:a16="http://schemas.microsoft.com/office/drawing/2014/main" id="{C7AB3235-CCE8-46E6-BDE8-EF71E09B00DA}"/>
+              </a:ext>
+            </a:extLst>
+          </p:cNvPr>
+          <p:cNvSpPr>
+            <a:spLocks noGrp="1"/>
+          </p:cNvSpPr>
+          <p:nvPr>
+            <p:ph type="title"/>
+          </p:nvPr>
+        </p:nvSpPr>
+        <p:spPr/>
+        <p:txBody>
+          <a:bodyPr/>
+          <a:lstStyle/>
+          <a:p>
+            <a:r>
+              <a:rPr lang="en-US" dirty="0"/>
+              <a:t>Presentation End – open lab and questions</a:t>
+            </a:r>
+          </a:p>
+        </p:txBody>
+      </p:sp>
+      <p:sp>
+        <p:nvSpPr>
+          <p:cNvPr id="3" name="Content Placeholder 2">
+            <a:extLst>
+              <a:ext uri="{FF2B5EF4-FFF2-40B4-BE49-F238E27FC236}">
+                <a16:creationId xmlns:a16="http://schemas.microsoft.com/office/drawing/2014/main" id="{3A9669AB-E7B2-4895-9E7F-B06438F6702B}"/>
+              </a:ext>
+            </a:extLst>
+          </p:cNvPr>
+          <p:cNvSpPr>
+            <a:spLocks noGrp="1"/>
+          </p:cNvSpPr>
+          <p:nvPr>
+            <p:ph idx="1"/>
+          </p:nvPr>
+        </p:nvSpPr>
+        <p:spPr/>
+        <p:txBody>
+          <a:bodyPr/>
+          <a:lstStyle/>
+          <a:p>
+            <a:r>
+              <a:rPr lang="en-US" dirty="0"/>
+              <a:t>Can’t think of a question or need to leave before I can answer?</a:t>
+            </a:r>
+          </a:p>
+          <a:p>
+            <a:pPr lvl="1"/>
+            <a:r>
+              <a:rPr lang="en-US" dirty="0"/>
+              <a:t>No worries! Send me an email – </a:t>
+            </a:r>
+            <a:r>
+              <a:rPr lang="en-US" dirty="0">
+                <a:solidFill>
+                  <a:schemeClr val="tx1">
+                    <a:lumMod val="95000"/>
+                  </a:schemeClr>
+                </a:solidFill>
+                <a:hlinkClick r:id="rId2">
+                  <a:extLst>
+                    <a:ext uri="{A12FA001-AC4F-418D-AE19-62706E023703}">
+                      <ahyp:hlinkClr xmlns:ahyp="http://schemas.microsoft.com/office/drawing/2018/hyperlinkcolor" val="tx"/>
+                    </a:ext>
+                  </a:extLst>
+                </a:hlinkClick>
+              </a:rPr>
+              <a:t>zach@zach-martin.com</a:t>
+            </a:r>
+            <a:endParaRPr lang="en-US" dirty="0">
+              <a:solidFill>
+                <a:schemeClr val="tx1">
+                  <a:lumMod val="95000"/>
+                </a:schemeClr>
+              </a:solidFill>
+            </a:endParaRPr>
+          </a:p>
+        </p:txBody>
+      </p:sp>
+    </p:spTree>
+    <p:extLst>
+      <p:ext uri="{BB962C8B-B14F-4D97-AF65-F5344CB8AC3E}">
+        <p14:creationId xmlns:p14="http://schemas.microsoft.com/office/powerpoint/2010/main" val="3460011935"/>
       </p:ext>
     </p:extLst>
   </p:cSld>
@@ -15974,6 +16769,23 @@
 </file>
 
 <file path=customXml/item1.xml><?xml version="1.0" encoding="utf-8"?>
+<?mso-contentType ?>
+<FormTemplates xmlns="http://schemas.microsoft.com/sharepoint/v3/contenttype/forms">
+  <Display>DocumentLibraryForm</Display>
+  <Edit>DocumentLibraryForm</Edit>
+  <New>DocumentLibraryForm</New>
+</FormTemplates>
+</file>
+
+<file path=customXml/item2.xml><?xml version="1.0" encoding="utf-8"?>
+<p:properties xmlns:p="http://schemas.microsoft.com/office/2006/metadata/properties" xmlns:xsi="http://www.w3.org/2001/XMLSchema-instance" xmlns:pc="http://schemas.microsoft.com/office/infopath/2007/PartnerControls">
+  <documentManagement>
+    <MediaServiceKeyPoints xmlns="71af3243-3dd4-4a8d-8c0d-dd76da1f02a5" xsi:nil="true"/>
+  </documentManagement>
+</p:properties>
+</file>
+
+<file path=customXml/item3.xml><?xml version="1.0" encoding="utf-8"?>
 <ct:contentTypeSchema xmlns:ct="http://schemas.microsoft.com/office/2006/metadata/contentType" xmlns:ma="http://schemas.microsoft.com/office/2006/metadata/properties/metaAttributes" ct:_="" ma:_="" ma:contentTypeName="Document" ma:contentTypeID="0x01010079F111ED35F8CC479449609E8A0923A6" ma:contentTypeVersion="11" ma:contentTypeDescription="Create a new document." ma:contentTypeScope="" ma:versionID="96291512c1ee715ab617f4c07df79fc1">
   <xsd:schema xmlns:xsd="http://www.w3.org/2001/XMLSchema" xmlns:xs="http://www.w3.org/2001/XMLSchema" xmlns:p="http://schemas.microsoft.com/office/2006/metadata/properties" xmlns:ns2="71af3243-3dd4-4a8d-8c0d-dd76da1f02a5" xmlns:ns3="16c05727-aa75-4e4a-9b5f-8a80a1165891" targetNamespace="http://schemas.microsoft.com/office/2006/metadata/properties" ma:root="true" ma:fieldsID="8256c27c40ca5c40ce1cf6c44f0205df" ns2:_="" ns3:_="">
     <xsd:import namespace="71af3243-3dd4-4a8d-8c0d-dd76da1f02a5"/>
@@ -16184,24 +16996,25 @@
 </ct:contentTypeSchema>
 </file>
 
-<file path=customXml/item2.xml><?xml version="1.0" encoding="utf-8"?>
-<p:properties xmlns:p="http://schemas.microsoft.com/office/2006/metadata/properties" xmlns:xsi="http://www.w3.org/2001/XMLSchema-instance" xmlns:pc="http://schemas.microsoft.com/office/infopath/2007/PartnerControls">
-  <documentManagement>
-    <MediaServiceKeyPoints xmlns="71af3243-3dd4-4a8d-8c0d-dd76da1f02a5" xsi:nil="true"/>
-  </documentManagement>
-</p:properties>
+<file path=customXml/itemProps1.xml><?xml version="1.0" encoding="utf-8"?>
+<ds:datastoreItem xmlns:ds="http://schemas.openxmlformats.org/officeDocument/2006/customXml" ds:itemID="{B579702B-25C7-40D7-9E29-7686B11A9660}">
+  <ds:schemaRefs>
+    <ds:schemaRef ds:uri="http://schemas.microsoft.com/sharepoint/v3/contenttype/forms"/>
+  </ds:schemaRefs>
+</ds:datastoreItem>
 </file>
 
-<file path=customXml/item3.xml><?xml version="1.0" encoding="utf-8"?>
-<?mso-contentType ?>
-<FormTemplates xmlns="http://schemas.microsoft.com/sharepoint/v3/contenttype/forms">
-  <Display>DocumentLibraryForm</Display>
-  <Edit>DocumentLibraryForm</Edit>
-  <New>DocumentLibraryForm</New>
-</FormTemplates>
+<file path=customXml/itemProps2.xml><?xml version="1.0" encoding="utf-8"?>
+<ds:datastoreItem xmlns:ds="http://schemas.openxmlformats.org/officeDocument/2006/customXml" ds:itemID="{E7866CFD-F94E-4AE5-ACEA-86FEC0F48A10}">
+  <ds:schemaRefs>
+    <ds:schemaRef ds:uri="http://schemas.microsoft.com/office/2006/metadata/properties"/>
+    <ds:schemaRef ds:uri="http://schemas.microsoft.com/office/infopath/2007/PartnerControls"/>
+    <ds:schemaRef ds:uri="71af3243-3dd4-4a8d-8c0d-dd76da1f02a5"/>
+  </ds:schemaRefs>
+</ds:datastoreItem>
 </file>
 
-<file path=customXml/itemProps1.xml><?xml version="1.0" encoding="utf-8"?>
+<file path=customXml/itemProps3.xml><?xml version="1.0" encoding="utf-8"?>
 <ds:datastoreItem xmlns:ds="http://schemas.openxmlformats.org/officeDocument/2006/customXml" ds:itemID="{A7C0B241-13E5-418D-8920-D23491E2D2C0}">
   <ds:schemaRefs>
     <ds:schemaRef ds:uri="http://schemas.microsoft.com/office/2006/metadata/contentType"/>
@@ -16218,22 +17031,4 @@
     <ds:schemaRef ds:uri="http://schemas.microsoft.com/internal/obd"/>
   </ds:schemaRefs>
 </ds:datastoreItem>
-</file>
-
-<file path=customXml/itemProps2.xml><?xml version="1.0" encoding="utf-8"?>
-<ds:datastoreItem xmlns:ds="http://schemas.openxmlformats.org/officeDocument/2006/customXml" ds:itemID="{E7866CFD-F94E-4AE5-ACEA-86FEC0F48A10}">
-  <ds:schemaRefs>
-    <ds:schemaRef ds:uri="http://schemas.microsoft.com/office/2006/metadata/properties"/>
-    <ds:schemaRef ds:uri="http://schemas.microsoft.com/office/infopath/2007/PartnerControls"/>
-    <ds:schemaRef ds:uri="71af3243-3dd4-4a8d-8c0d-dd76da1f02a5"/>
-  </ds:schemaRefs>
-</ds:datastoreItem>
-</file>
-
-<file path=customXml/itemProps3.xml><?xml version="1.0" encoding="utf-8"?>
-<ds:datastoreItem xmlns:ds="http://schemas.openxmlformats.org/officeDocument/2006/customXml" ds:itemID="{B579702B-25C7-40D7-9E29-7686B11A9660}">
-  <ds:schemaRefs>
-    <ds:schemaRef ds:uri="http://schemas.microsoft.com/sharepoint/v3/contenttype/forms"/>
-  </ds:schemaRefs>
-</ds:datastoreItem>
 </file>
</xml_diff>